<commit_message>
Tagesplan AM und MM grade gezogen und eingecheckt
</commit_message>
<xml_diff>
--- a/agile moves/Tomatoes (TOM)/ger/apprentice/ger_TOM_04_Alles_Tomate_Tagesplan_AM_A.pptx
+++ b/agile moves/Tomatoes (TOM)/ger/apprentice/ger_TOM_04_Alles_Tomate_Tagesplan_AM_A.pptx
@@ -725,7 +725,7 @@
           <a:p>
             <a:fld id="{FF5B2BAF-DF38-0A48-A798-0C06E514FD52}" type="datetimeFigureOut">
               <a:rPr lang="de-DE" smtClean="0"/>
-              <a:t>29.05.15</a:t>
+              <a:t>15.07.15</a:t>
             </a:fld>
             <a:endParaRPr lang="de-DE" dirty="0"/>
           </a:p>
@@ -995,7 +995,7 @@
           <a:p>
             <a:fld id="{FF5B2BAF-DF38-0A48-A798-0C06E514FD52}" type="datetimeFigureOut">
               <a:rPr lang="de-DE" smtClean="0"/>
-              <a:t>29.05.15</a:t>
+              <a:t>15.07.15</a:t>
             </a:fld>
             <a:endParaRPr lang="de-DE" dirty="0"/>
           </a:p>
@@ -1625,7 +1625,14 @@
                 <a:latin typeface="Avenir Light"/>
                 <a:cs typeface="Avenir Light"/>
               </a:rPr>
-              <a:t> TOMATE - TAGESPLAN</a:t>
+              <a:t> </a:t>
+            </a:r>
+            <a:r>
+              <a:rPr lang="de-DE" dirty="0" smtClean="0">
+                <a:latin typeface="Avenir Light"/>
+                <a:cs typeface="Avenir Light"/>
+              </a:rPr>
+              <a:t>TOMATE</a:t>
             </a:r>
             <a:endParaRPr lang="de-DE" dirty="0">
               <a:latin typeface="Avenir Light"/>
@@ -1804,6 +1811,48 @@
               </a:spcBef>
             </a:pPr>
             <a:endParaRPr lang="de-DE" dirty="0"/>
+          </a:p>
+        </p:txBody>
+      </p:sp>
+      <p:sp>
+        <p:nvSpPr>
+          <p:cNvPr id="5" name="Textfeld 4"/>
+          <p:cNvSpPr txBox="1"/>
+          <p:nvPr/>
+        </p:nvSpPr>
+        <p:spPr>
+          <a:xfrm>
+            <a:off x="1171117" y="1216064"/>
+            <a:ext cx="1546815" cy="246221"/>
+          </a:xfrm>
+          <a:prstGeom prst="rect">
+            <a:avLst/>
+          </a:prstGeom>
+          <a:noFill/>
+        </p:spPr>
+        <p:txBody>
+          <a:bodyPr wrap="none" rtlCol="0">
+            <a:spAutoFit/>
+          </a:bodyPr>
+          <a:lstStyle/>
+          <a:p>
+            <a:r>
+              <a:rPr lang="de-DE" sz="1000" dirty="0" smtClean="0">
+                <a:solidFill>
+                  <a:srgbClr val="616575"/>
+                </a:solidFill>
+                <a:latin typeface="Avenir Book"/>
+                <a:cs typeface="Avenir Book"/>
+              </a:rPr>
+              <a:t>REGINA BRANDHUBER</a:t>
+            </a:r>
+            <a:endParaRPr lang="de-DE" sz="1000" dirty="0">
+              <a:solidFill>
+                <a:srgbClr val="616575"/>
+              </a:solidFill>
+              <a:latin typeface="Avenir Book"/>
+              <a:cs typeface="Avenir Book"/>
+            </a:endParaRPr>
           </a:p>
         </p:txBody>
       </p:sp>
@@ -1856,7 +1905,7 @@
           <a:p>
             <a:pPr>
               <a:lnSpc>
-                <a:spcPts val="2000"/>
+                <a:spcPct val="100000"/>
               </a:lnSpc>
               <a:spcBef>
                 <a:spcPts val="1000"/>
@@ -1875,7 +1924,7 @@
           <a:p>
             <a:pPr>
               <a:lnSpc>
-                <a:spcPts val="2000"/>
+                <a:spcPct val="100000"/>
               </a:lnSpc>
               <a:spcBef>
                 <a:spcPts val="1000"/>
@@ -1894,7 +1943,7 @@
           <a:p>
             <a:pPr>
               <a:lnSpc>
-                <a:spcPts val="2000"/>
+                <a:spcPct val="100000"/>
               </a:lnSpc>
               <a:spcBef>
                 <a:spcPts val="1000"/>
@@ -1923,7 +1972,7 @@
           <a:p>
             <a:pPr>
               <a:lnSpc>
-                <a:spcPts val="2000"/>
+                <a:spcPct val="100000"/>
               </a:lnSpc>
               <a:spcBef>
                 <a:spcPts val="1000"/>
@@ -1931,7 +1980,22 @@
             </a:pPr>
             <a:r>
               <a:rPr lang="de-DE" sz="1200" dirty="0"/>
-              <a:t>Schreibe in zwei Wochen acht Tagespläne und bewerte acht Tagespläne Deiner Kollegen mit eins bis fünf Sternen</a:t>
+              <a:t>Schreibe in zwei Wochen acht Tagespläne und bewerte acht </a:t>
+            </a:r>
+            <a:r>
+              <a:rPr lang="de-DE" sz="1200" dirty="0" smtClean="0"/>
+              <a:t/>
+            </a:r>
+            <a:br>
+              <a:rPr lang="de-DE" sz="1200" dirty="0" smtClean="0"/>
+            </a:br>
+            <a:r>
+              <a:rPr lang="de-DE" sz="1200" dirty="0" smtClean="0"/>
+              <a:t>Tagespläne </a:t>
+            </a:r>
+            <a:r>
+              <a:rPr lang="de-DE" sz="1200" dirty="0"/>
+              <a:t>Deiner Kollegen mit eins bis fünf Sternen</a:t>
             </a:r>
             <a:r>
               <a:rPr lang="de-DE" sz="1200" dirty="0" smtClean="0"/>
@@ -1952,6 +2016,36 @@
           </a:p>
         </p:txBody>
       </p:sp>
+      <p:pic>
+        <p:nvPicPr>
+          <p:cNvPr id="3" name="Bild 2" descr="am_Icon_apprentice.pdf"/>
+          <p:cNvPicPr>
+            <a:picLocks noChangeAspect="1"/>
+          </p:cNvPicPr>
+          <p:nvPr/>
+        </p:nvPicPr>
+        <p:blipFill>
+          <a:blip r:embed="rId2">
+            <a:extLst>
+              <a:ext uri="{28A0092B-C50C-407E-A947-70E740481C1C}">
+                <a14:useLocalDpi xmlns:a14="http://schemas.microsoft.com/office/drawing/2010/main" val="0"/>
+              </a:ext>
+            </a:extLst>
+          </a:blip>
+          <a:stretch>
+            <a:fillRect/>
+          </a:stretch>
+        </p:blipFill>
+        <p:spPr>
+          <a:xfrm>
+            <a:off x="5816513" y="3592674"/>
+            <a:ext cx="939800" cy="914400"/>
+          </a:xfrm>
+          <a:prstGeom prst="rect">
+            <a:avLst/>
+          </a:prstGeom>
+        </p:spPr>
+      </p:pic>
     </p:spTree>
     <p:extLst>
       <p:ext uri="{BB962C8B-B14F-4D97-AF65-F5344CB8AC3E}">

</xml_diff>